<commit_message>
Update 74 & 92
</commit_message>
<xml_diff>
--- a/74為鹽為光.pptx
+++ b/74為鹽為光.pptx
@@ -311,7 +311,7 @@
             <a:fld id="{74BC4726-2204-402F-8651-3DE2807316DF}" type="datetimeFigureOut">
               <a:rPr lang="en-US" smtClean="0"/>
               <a:pPr/>
-              <a:t>8/7/2020</a:t>
+              <a:t>7/13/2021</a:t>
             </a:fld>
             <a:endParaRPr lang="en-US"/>
           </a:p>
@@ -483,7 +483,7 @@
             <a:fld id="{74BC4726-2204-402F-8651-3DE2807316DF}" type="datetimeFigureOut">
               <a:rPr lang="en-US" smtClean="0"/>
               <a:pPr/>
-              <a:t>8/7/2020</a:t>
+              <a:t>7/13/2021</a:t>
             </a:fld>
             <a:endParaRPr lang="en-US"/>
           </a:p>
@@ -665,7 +665,7 @@
             <a:fld id="{74BC4726-2204-402F-8651-3DE2807316DF}" type="datetimeFigureOut">
               <a:rPr lang="en-US" smtClean="0"/>
               <a:pPr/>
-              <a:t>8/7/2020</a:t>
+              <a:t>7/13/2021</a:t>
             </a:fld>
             <a:endParaRPr lang="en-US"/>
           </a:p>
@@ -837,7 +837,7 @@
             <a:fld id="{74BC4726-2204-402F-8651-3DE2807316DF}" type="datetimeFigureOut">
               <a:rPr lang="en-US" smtClean="0"/>
               <a:pPr/>
-              <a:t>8/7/2020</a:t>
+              <a:t>7/13/2021</a:t>
             </a:fld>
             <a:endParaRPr lang="en-US"/>
           </a:p>
@@ -1085,7 +1085,7 @@
             <a:fld id="{74BC4726-2204-402F-8651-3DE2807316DF}" type="datetimeFigureOut">
               <a:rPr lang="en-US" smtClean="0"/>
               <a:pPr/>
-              <a:t>8/7/2020</a:t>
+              <a:t>7/13/2021</a:t>
             </a:fld>
             <a:endParaRPr lang="en-US"/>
           </a:p>
@@ -1375,7 +1375,7 @@
             <a:fld id="{74BC4726-2204-402F-8651-3DE2807316DF}" type="datetimeFigureOut">
               <a:rPr lang="en-US" smtClean="0"/>
               <a:pPr/>
-              <a:t>8/7/2020</a:t>
+              <a:t>7/13/2021</a:t>
             </a:fld>
             <a:endParaRPr lang="en-US"/>
           </a:p>
@@ -1799,7 +1799,7 @@
             <a:fld id="{74BC4726-2204-402F-8651-3DE2807316DF}" type="datetimeFigureOut">
               <a:rPr lang="en-US" smtClean="0"/>
               <a:pPr/>
-              <a:t>8/7/2020</a:t>
+              <a:t>7/13/2021</a:t>
             </a:fld>
             <a:endParaRPr lang="en-US"/>
           </a:p>
@@ -1919,7 +1919,7 @@
             <a:fld id="{74BC4726-2204-402F-8651-3DE2807316DF}" type="datetimeFigureOut">
               <a:rPr lang="en-US" smtClean="0"/>
               <a:pPr/>
-              <a:t>8/7/2020</a:t>
+              <a:t>7/13/2021</a:t>
             </a:fld>
             <a:endParaRPr lang="en-US"/>
           </a:p>
@@ -2016,7 +2016,7 @@
             <a:fld id="{74BC4726-2204-402F-8651-3DE2807316DF}" type="datetimeFigureOut">
               <a:rPr lang="en-US" smtClean="0"/>
               <a:pPr/>
-              <a:t>8/7/2020</a:t>
+              <a:t>7/13/2021</a:t>
             </a:fld>
             <a:endParaRPr lang="en-US"/>
           </a:p>
@@ -2295,7 +2295,7 @@
             <a:fld id="{74BC4726-2204-402F-8651-3DE2807316DF}" type="datetimeFigureOut">
               <a:rPr lang="en-US" smtClean="0"/>
               <a:pPr/>
-              <a:t>8/7/2020</a:t>
+              <a:t>7/13/2021</a:t>
             </a:fld>
             <a:endParaRPr lang="en-US"/>
           </a:p>
@@ -2554,7 +2554,7 @@
             <a:fld id="{74BC4726-2204-402F-8651-3DE2807316DF}" type="datetimeFigureOut">
               <a:rPr lang="en-US" smtClean="0"/>
               <a:pPr/>
-              <a:t>8/7/2020</a:t>
+              <a:t>7/13/2021</a:t>
             </a:fld>
             <a:endParaRPr lang="en-US"/>
           </a:p>
@@ -2774,7 +2774,7 @@
             <a:fld id="{74BC4726-2204-402F-8651-3DE2807316DF}" type="datetimeFigureOut">
               <a:rPr lang="en-US" smtClean="0"/>
               <a:pPr/>
-              <a:t>8/7/2020</a:t>
+              <a:t>7/13/2021</a:t>
             </a:fld>
             <a:endParaRPr lang="en-US"/>
           </a:p>
@@ -3219,6 +3219,26 @@
           <a:lstStyle/>
           <a:p>
             <a:r>
+              <a:rPr lang="zh-CN" altLang="en-US" b="1" dirty="0" smtClean="0">
+                <a:solidFill>
+                  <a:srgbClr val="000066"/>
+                </a:solidFill>
+                <a:latin typeface="微軟正黑體" pitchFamily="34" charset="-120"/>
+                <a:ea typeface="微軟正黑體" pitchFamily="34" charset="-120"/>
+              </a:rPr>
+              <a:t>太  </a:t>
+            </a:r>
+            <a:r>
+              <a:rPr lang="en-US" altLang="zh-CN" b="1" dirty="0" smtClean="0">
+                <a:solidFill>
+                  <a:srgbClr val="000066"/>
+                </a:solidFill>
+                <a:latin typeface="微軟正黑體" pitchFamily="34" charset="-120"/>
+                <a:ea typeface="微軟正黑體" pitchFamily="34" charset="-120"/>
+              </a:rPr>
+              <a:t>5</a:t>
+            </a:r>
+            <a:r>
               <a:rPr lang="zh-CN" altLang="en-US" b="1" dirty="0">
                 <a:solidFill>
                   <a:srgbClr val="000066"/>
@@ -3226,7 +3246,49 @@
                 <a:latin typeface="微軟正黑體" pitchFamily="34" charset="-120"/>
                 <a:ea typeface="微軟正黑體" pitchFamily="34" charset="-120"/>
               </a:rPr>
-              <a:t>太</a:t>
+              <a:t>：</a:t>
+            </a:r>
+            <a:r>
+              <a:rPr lang="en-US" altLang="zh-CN" b="1" dirty="0" smtClean="0">
+                <a:solidFill>
+                  <a:srgbClr val="000066"/>
+                </a:solidFill>
+                <a:latin typeface="微軟正黑體" pitchFamily="34" charset="-120"/>
+                <a:ea typeface="微軟正黑體" pitchFamily="34" charset="-120"/>
+              </a:rPr>
+              <a:t>13-16</a:t>
+            </a:r>
+          </a:p>
+          <a:p>
+            <a:r>
+              <a:rPr lang="zh-CN" altLang="en-US" b="1" dirty="0" smtClean="0">
+                <a:solidFill>
+                  <a:srgbClr val="000066"/>
+                </a:solidFill>
+                <a:latin typeface="微軟正黑體" pitchFamily="34" charset="-120"/>
+                <a:ea typeface="微軟正黑體" pitchFamily="34" charset="-120"/>
+              </a:rPr>
+              <a:t>羅  </a:t>
+            </a:r>
+            <a:r>
+              <a:rPr lang="en-US" altLang="zh-CN" b="1" dirty="0" smtClean="0">
+                <a:solidFill>
+                  <a:srgbClr val="000066"/>
+                </a:solidFill>
+                <a:latin typeface="微軟正黑體" pitchFamily="34" charset="-120"/>
+                <a:ea typeface="微軟正黑體" pitchFamily="34" charset="-120"/>
+              </a:rPr>
+              <a:t>14</a:t>
+            </a:r>
+            <a:r>
+              <a:rPr lang="zh-CN" altLang="en-US" b="1" dirty="0">
+                <a:solidFill>
+                  <a:srgbClr val="000066"/>
+                </a:solidFill>
+                <a:latin typeface="微軟正黑體" pitchFamily="34" charset="-120"/>
+                <a:ea typeface="微軟正黑體" pitchFamily="34" charset="-120"/>
+              </a:rPr>
+              <a:t>：</a:t>
             </a:r>
             <a:r>
               <a:rPr lang="en-US" altLang="zh-CN" b="1" dirty="0">
@@ -3236,7 +3298,7 @@
                 <a:latin typeface="微軟正黑體" pitchFamily="34" charset="-120"/>
                 <a:ea typeface="微軟正黑體" pitchFamily="34" charset="-120"/>
               </a:rPr>
-              <a:t>5</a:t>
+              <a:t>7-8</a:t>
             </a:r>
             <a:r>
               <a:rPr lang="zh-CN" altLang="en-US" b="1" dirty="0">
@@ -3246,6 +3308,46 @@
                 <a:latin typeface="微軟正黑體" pitchFamily="34" charset="-120"/>
                 <a:ea typeface="微軟正黑體" pitchFamily="34" charset="-120"/>
               </a:rPr>
+              <a:t>，</a:t>
+            </a:r>
+            <a:r>
+              <a:rPr lang="en-US" altLang="zh-CN" b="1" dirty="0">
+                <a:solidFill>
+                  <a:srgbClr val="000066"/>
+                </a:solidFill>
+                <a:latin typeface="微軟正黑體" pitchFamily="34" charset="-120"/>
+                <a:ea typeface="微軟正黑體" pitchFamily="34" charset="-120"/>
+              </a:rPr>
+              <a:t>16-17</a:t>
+            </a:r>
+            <a:r>
+              <a:rPr lang="zh-CN" altLang="en-US" b="1" dirty="0">
+                <a:solidFill>
+                  <a:srgbClr val="000066"/>
+                </a:solidFill>
+                <a:latin typeface="微軟正黑體" pitchFamily="34" charset="-120"/>
+                <a:ea typeface="微軟正黑體" pitchFamily="34" charset="-120"/>
+              </a:rPr>
+              <a:t>；</a:t>
+            </a:r>
+            <a:r>
+              <a:rPr lang="en-US" altLang="zh-CN" b="1" dirty="0">
+                <a:solidFill>
+                  <a:srgbClr val="000066"/>
+                </a:solidFill>
+                <a:latin typeface="微軟正黑體" pitchFamily="34" charset="-120"/>
+                <a:ea typeface="微軟正黑體" pitchFamily="34" charset="-120"/>
+              </a:rPr>
+              <a:t>13</a:t>
+            </a:r>
+            <a:r>
+              <a:rPr lang="zh-CN" altLang="en-US" b="1" dirty="0">
+                <a:solidFill>
+                  <a:srgbClr val="000066"/>
+                </a:solidFill>
+                <a:latin typeface="微軟正黑體" pitchFamily="34" charset="-120"/>
+                <a:ea typeface="微軟正黑體" pitchFamily="34" charset="-120"/>
+              </a:rPr>
               <a:t>：</a:t>
             </a:r>
             <a:r>
@@ -3256,124 +3358,22 @@
                 <a:latin typeface="微軟正黑體" pitchFamily="34" charset="-120"/>
                 <a:ea typeface="微軟正黑體" pitchFamily="34" charset="-120"/>
               </a:rPr>
-              <a:t>13-16</a:t>
-            </a:r>
-          </a:p>
-          <a:p>
-            <a:r>
-              <a:rPr lang="zh-CN" altLang="en-US" b="1" dirty="0" smtClean="0">
+              <a:t>11-14</a:t>
+            </a:r>
+          </a:p>
+          <a:p>
+            <a:r>
+              <a:rPr lang="zh-CN" altLang="en-US" b="1" smtClean="0">
                 <a:solidFill>
                   <a:srgbClr val="000066"/>
                 </a:solidFill>
                 <a:latin typeface="微軟正黑體" pitchFamily="34" charset="-120"/>
                 <a:ea typeface="微軟正黑體" pitchFamily="34" charset="-120"/>
               </a:rPr>
-              <a:t>羅</a:t>
-            </a:r>
-            <a:r>
-              <a:rPr lang="en-US" altLang="zh-CN" b="1" dirty="0">
-                <a:solidFill>
-                  <a:srgbClr val="000066"/>
-                </a:solidFill>
-                <a:latin typeface="微軟正黑體" pitchFamily="34" charset="-120"/>
-                <a:ea typeface="微軟正黑體" pitchFamily="34" charset="-120"/>
-              </a:rPr>
-              <a:t>14</a:t>
-            </a:r>
-            <a:r>
-              <a:rPr lang="zh-CN" altLang="en-US" b="1" dirty="0">
-                <a:solidFill>
-                  <a:srgbClr val="000066"/>
-                </a:solidFill>
-                <a:latin typeface="微軟正黑體" pitchFamily="34" charset="-120"/>
-                <a:ea typeface="微軟正黑體" pitchFamily="34" charset="-120"/>
-              </a:rPr>
-              <a:t>：</a:t>
-            </a:r>
-            <a:r>
-              <a:rPr lang="en-US" altLang="zh-CN" b="1" dirty="0">
-                <a:solidFill>
-                  <a:srgbClr val="000066"/>
-                </a:solidFill>
-                <a:latin typeface="微軟正黑體" pitchFamily="34" charset="-120"/>
-                <a:ea typeface="微軟正黑體" pitchFamily="34" charset="-120"/>
-              </a:rPr>
-              <a:t>7-8</a:t>
-            </a:r>
-            <a:r>
-              <a:rPr lang="zh-CN" altLang="en-US" b="1" dirty="0">
-                <a:solidFill>
-                  <a:srgbClr val="000066"/>
-                </a:solidFill>
-                <a:latin typeface="微軟正黑體" pitchFamily="34" charset="-120"/>
-                <a:ea typeface="微軟正黑體" pitchFamily="34" charset="-120"/>
-              </a:rPr>
-              <a:t>，</a:t>
-            </a:r>
-            <a:r>
-              <a:rPr lang="en-US" altLang="zh-CN" b="1" dirty="0">
-                <a:solidFill>
-                  <a:srgbClr val="000066"/>
-                </a:solidFill>
-                <a:latin typeface="微軟正黑體" pitchFamily="34" charset="-120"/>
-                <a:ea typeface="微軟正黑體" pitchFamily="34" charset="-120"/>
-              </a:rPr>
-              <a:t>16-17</a:t>
-            </a:r>
-            <a:r>
-              <a:rPr lang="zh-CN" altLang="en-US" b="1" dirty="0">
-                <a:solidFill>
-                  <a:srgbClr val="000066"/>
-                </a:solidFill>
-                <a:latin typeface="微軟正黑體" pitchFamily="34" charset="-120"/>
-                <a:ea typeface="微軟正黑體" pitchFamily="34" charset="-120"/>
-              </a:rPr>
-              <a:t>；</a:t>
-            </a:r>
-            <a:r>
-              <a:rPr lang="en-US" altLang="zh-CN" b="1" dirty="0">
-                <a:solidFill>
-                  <a:srgbClr val="000066"/>
-                </a:solidFill>
-                <a:latin typeface="微軟正黑體" pitchFamily="34" charset="-120"/>
-                <a:ea typeface="微軟正黑體" pitchFamily="34" charset="-120"/>
-              </a:rPr>
-              <a:t>13</a:t>
-            </a:r>
-            <a:r>
-              <a:rPr lang="zh-CN" altLang="en-US" b="1" dirty="0">
-                <a:solidFill>
-                  <a:srgbClr val="000066"/>
-                </a:solidFill>
-                <a:latin typeface="微軟正黑體" pitchFamily="34" charset="-120"/>
-                <a:ea typeface="微軟正黑體" pitchFamily="34" charset="-120"/>
-              </a:rPr>
-              <a:t>：</a:t>
-            </a:r>
-            <a:r>
-              <a:rPr lang="en-US" altLang="zh-CN" b="1" dirty="0" smtClean="0">
-                <a:solidFill>
-                  <a:srgbClr val="000066"/>
-                </a:solidFill>
-                <a:latin typeface="微軟正黑體" pitchFamily="34" charset="-120"/>
-                <a:ea typeface="微軟正黑體" pitchFamily="34" charset="-120"/>
-              </a:rPr>
-              <a:t>11-14</a:t>
-            </a:r>
-          </a:p>
-          <a:p>
-            <a:r>
-              <a:rPr lang="zh-CN" altLang="en-US" b="1" dirty="0" smtClean="0">
-                <a:solidFill>
-                  <a:srgbClr val="000066"/>
-                </a:solidFill>
-                <a:latin typeface="微軟正黑體" pitchFamily="34" charset="-120"/>
-                <a:ea typeface="微軟正黑體" pitchFamily="34" charset="-120"/>
-              </a:rPr>
-              <a:t>腓</a:t>
-            </a:r>
-            <a:r>
-              <a:rPr lang="en-US" altLang="zh-CN" b="1" dirty="0">
+              <a:t>腓  </a:t>
+            </a:r>
+            <a:r>
+              <a:rPr lang="en-US" altLang="zh-CN" b="1" smtClean="0">
                 <a:solidFill>
                   <a:srgbClr val="000066"/>
                 </a:solidFill>
@@ -3599,10 +3599,6 @@
               </a:rPr>
               <a:t> </a:t>
             </a:r>
-            <a:endParaRPr lang="en-US" altLang="zh-TW" sz="6600" b="1" dirty="0">
-              <a:latin typeface="微軟正黑體" pitchFamily="34" charset="-120"/>
-              <a:ea typeface="微軟正黑體" pitchFamily="34" charset="-120"/>
-            </a:endParaRPr>
           </a:p>
         </p:txBody>
       </p:sp>

</xml_diff>